<commit_message>
fix PP + Media Queries
</commit_message>
<xml_diff>
--- a/P3.pptx
+++ b/P3.pptx
@@ -8,11 +8,12 @@
     <p:sldId id="256" r:id="rId2"/>
     <p:sldId id="257" r:id="rId3"/>
     <p:sldId id="258" r:id="rId4"/>
-    <p:sldId id="261" r:id="rId5"/>
-    <p:sldId id="259" r:id="rId6"/>
-    <p:sldId id="262" r:id="rId7"/>
-    <p:sldId id="264" r:id="rId8"/>
-    <p:sldId id="263" r:id="rId9"/>
+    <p:sldId id="265" r:id="rId5"/>
+    <p:sldId id="261" r:id="rId6"/>
+    <p:sldId id="259" r:id="rId7"/>
+    <p:sldId id="262" r:id="rId8"/>
+    <p:sldId id="264" r:id="rId9"/>
+    <p:sldId id="263" r:id="rId10"/>
   </p:sldIdLst>
   <p:sldSz cx="12192000" cy="6858000"/>
   <p:notesSz cx="6858000" cy="9144000"/>
@@ -6494,6 +6495,21 @@
             </a:pPr>
             <a:r>
               <a:rPr lang="fr-FR" sz="2400" dirty="0"/>
+              <a:t>Repository </a:t>
+            </a:r>
+            <a:r>
+              <a:rPr lang="fr-FR" sz="2400" dirty="0" err="1"/>
+              <a:t>Github</a:t>
+            </a:r>
+            <a:endParaRPr lang="fr-FR" sz="2400" dirty="0"/>
+          </a:p>
+          <a:p>
+            <a:pPr marL="514350" indent="-514350">
+              <a:buFont typeface="+mj-lt"/>
+              <a:buAutoNum type="arabicPeriod"/>
+            </a:pPr>
+            <a:r>
+              <a:rPr lang="fr-FR" sz="2400" dirty="0"/>
               <a:t>Rendu Visuel Mobile</a:t>
             </a:r>
           </a:p>
@@ -6897,6 +6913,391 @@
     <p:bg>
       <p:bgPr>
         <a:solidFill>
+          <a:schemeClr val="bg1">
+            <a:tint val="95000"/>
+            <a:satMod val="170000"/>
+          </a:schemeClr>
+        </a:solidFill>
+        <a:effectLst/>
+      </p:bgPr>
+    </p:bg>
+    <p:spTree>
+      <p:nvGrpSpPr>
+        <p:cNvPr id="1" name=""/>
+        <p:cNvGrpSpPr/>
+        <p:nvPr/>
+      </p:nvGrpSpPr>
+      <p:grpSpPr>
+        <a:xfrm>
+          <a:off x="0" y="0"/>
+          <a:ext cx="0" cy="0"/>
+          <a:chOff x="0" y="0"/>
+          <a:chExt cx="0" cy="0"/>
+        </a:xfrm>
+      </p:grpSpPr>
+      <p:sp>
+        <p:nvSpPr>
+          <p:cNvPr id="2" name="Titre 1">
+            <a:extLst>
+              <a:ext uri="{FF2B5EF4-FFF2-40B4-BE49-F238E27FC236}">
+                <a16:creationId xmlns:a16="http://schemas.microsoft.com/office/drawing/2014/main" id="{2A513E4A-D7AB-430F-EF8F-96DE11DD9307}"/>
+              </a:ext>
+            </a:extLst>
+          </p:cNvPr>
+          <p:cNvSpPr>
+            <a:spLocks noGrp="1"/>
+          </p:cNvSpPr>
+          <p:nvPr>
+            <p:ph type="title"/>
+          </p:nvPr>
+        </p:nvSpPr>
+        <p:spPr>
+          <a:xfrm>
+            <a:off x="7464614" y="1783959"/>
+            <a:ext cx="4087306" cy="2889114"/>
+          </a:xfrm>
+        </p:spPr>
+        <p:txBody>
+          <a:bodyPr vert="horz" lIns="91440" tIns="45720" rIns="91440" bIns="45720" rtlCol="0" anchor="b">
+            <a:normAutofit/>
+          </a:bodyPr>
+          <a:lstStyle/>
+          <a:p>
+            <a:r>
+              <a:rPr lang="en-US" sz="5400"/>
+              <a:t>2. Repository Github</a:t>
+            </a:r>
+          </a:p>
+        </p:txBody>
+      </p:sp>
+      <p:sp>
+        <p:nvSpPr>
+          <p:cNvPr id="1031" name="Freeform: Shape 1030">
+            <a:extLst>
+              <a:ext uri="{FF2B5EF4-FFF2-40B4-BE49-F238E27FC236}">
+                <a16:creationId xmlns:a16="http://schemas.microsoft.com/office/drawing/2014/main" id="{E49CC64F-7275-4E33-961B-0C5CDC439875}"/>
+              </a:ext>
+              <a:ext uri="{C183D7F6-B498-43B3-948B-1728B52AA6E4}">
+                <adec:decorative xmlns:adec="http://schemas.microsoft.com/office/drawing/2017/decorative" val="1"/>
+              </a:ext>
+            </a:extLst>
+          </p:cNvPr>
+          <p:cNvSpPr>
+            <a:spLocks noGrp="1" noRot="1" noChangeAspect="1" noMove="1" noResize="1" noEditPoints="1" noAdjustHandles="1" noChangeArrowheads="1" noChangeShapeType="1" noTextEdit="1"/>
+          </p:cNvSpPr>
+          <p:nvPr>
+            <p:extLst>
+              <p:ext uri="{386F3935-93C4-4BCD-93E2-E3B085C9AB24}">
+                <p16:designElem xmlns:p16="http://schemas.microsoft.com/office/powerpoint/2015/main" val="1"/>
+              </p:ext>
+            </p:extLst>
+          </p:nvPr>
+        </p:nvSpPr>
+        <p:spPr>
+          <a:xfrm flipH="1" flipV="1">
+            <a:off x="1" y="0"/>
+            <a:ext cx="7188051" cy="6858000"/>
+          </a:xfrm>
+          <a:custGeom>
+            <a:avLst/>
+            <a:gdLst>
+              <a:gd name="connsiteX0" fmla="*/ 7188051 w 7188051"/>
+              <a:gd name="connsiteY0" fmla="*/ 6858000 h 6858000"/>
+              <a:gd name="connsiteX1" fmla="*/ 108694 w 7188051"/>
+              <a:gd name="connsiteY1" fmla="*/ 6858000 h 6858000"/>
+              <a:gd name="connsiteX2" fmla="*/ 79127 w 7188051"/>
+              <a:gd name="connsiteY2" fmla="*/ 6681235 h 6858000"/>
+              <a:gd name="connsiteX3" fmla="*/ 0 w 7188051"/>
+              <a:gd name="connsiteY3" fmla="*/ 5565888 h 6858000"/>
+              <a:gd name="connsiteX4" fmla="*/ 2190696 w 7188051"/>
+              <a:gd name="connsiteY4" fmla="*/ 145339 h 6858000"/>
+              <a:gd name="connsiteX5" fmla="*/ 2339431 w 7188051"/>
+              <a:gd name="connsiteY5" fmla="*/ 0 h 6858000"/>
+              <a:gd name="connsiteX6" fmla="*/ 7188051 w 7188051"/>
+              <a:gd name="connsiteY6" fmla="*/ 0 h 6858000"/>
+            </a:gdLst>
+            <a:ahLst/>
+            <a:cxnLst>
+              <a:cxn ang="0">
+                <a:pos x="connsiteX0" y="connsiteY0"/>
+              </a:cxn>
+              <a:cxn ang="0">
+                <a:pos x="connsiteX1" y="connsiteY1"/>
+              </a:cxn>
+              <a:cxn ang="0">
+                <a:pos x="connsiteX2" y="connsiteY2"/>
+              </a:cxn>
+              <a:cxn ang="0">
+                <a:pos x="connsiteX3" y="connsiteY3"/>
+              </a:cxn>
+              <a:cxn ang="0">
+                <a:pos x="connsiteX4" y="connsiteY4"/>
+              </a:cxn>
+              <a:cxn ang="0">
+                <a:pos x="connsiteX5" y="connsiteY5"/>
+              </a:cxn>
+              <a:cxn ang="0">
+                <a:pos x="connsiteX6" y="connsiteY6"/>
+              </a:cxn>
+            </a:cxnLst>
+            <a:rect l="l" t="t" r="r" b="b"/>
+            <a:pathLst>
+              <a:path w="7188051" h="6858000">
+                <a:moveTo>
+                  <a:pt x="7188051" y="6858000"/>
+                </a:moveTo>
+                <a:lnTo>
+                  <a:pt x="108694" y="6858000"/>
+                </a:lnTo>
+                <a:lnTo>
+                  <a:pt x="79127" y="6681235"/>
+                </a:lnTo>
+                <a:cubicBezTo>
+                  <a:pt x="26981" y="6316967"/>
+                  <a:pt x="0" y="5944579"/>
+                  <a:pt x="0" y="5565888"/>
+                </a:cubicBezTo>
+                <a:cubicBezTo>
+                  <a:pt x="0" y="3459953"/>
+                  <a:pt x="834428" y="1548908"/>
+                  <a:pt x="2190696" y="145339"/>
+                </a:cubicBezTo>
+                <a:lnTo>
+                  <a:pt x="2339431" y="0"/>
+                </a:lnTo>
+                <a:lnTo>
+                  <a:pt x="7188051" y="0"/>
+                </a:lnTo>
+                <a:close/>
+              </a:path>
+            </a:pathLst>
+          </a:custGeom>
+          <a:solidFill>
+            <a:schemeClr val="tx1">
+              <a:alpha val="80000"/>
+            </a:schemeClr>
+          </a:solidFill>
+          <a:ln>
+            <a:noFill/>
+          </a:ln>
+        </p:spPr>
+        <p:style>
+          <a:lnRef idx="2">
+            <a:schemeClr val="accent1">
+              <a:shade val="50000"/>
+            </a:schemeClr>
+          </a:lnRef>
+          <a:fillRef idx="1">
+            <a:schemeClr val="accent1"/>
+          </a:fillRef>
+          <a:effectRef idx="0">
+            <a:schemeClr val="accent1"/>
+          </a:effectRef>
+          <a:fontRef idx="minor">
+            <a:schemeClr val="lt1"/>
+          </a:fontRef>
+        </p:style>
+        <p:txBody>
+          <a:bodyPr wrap="square" rtlCol="0" anchor="ctr">
+            <a:noAutofit/>
+          </a:bodyPr>
+          <a:lstStyle/>
+          <a:p>
+            <a:pPr algn="ctr"/>
+            <a:endParaRPr lang="en-US"/>
+          </a:p>
+        </p:txBody>
+      </p:sp>
+      <p:pic>
+        <p:nvPicPr>
+          <p:cNvPr id="1026" name="Picture 2" descr="GitHub - Téléchargement gratuit - 2022 Dernière version">
+            <a:extLst>
+              <a:ext uri="{FF2B5EF4-FFF2-40B4-BE49-F238E27FC236}">
+                <a16:creationId xmlns:a16="http://schemas.microsoft.com/office/drawing/2014/main" id="{5AFAA79B-E7DE-4C2C-A3A3-3D014D695E42}"/>
+              </a:ext>
+            </a:extLst>
+          </p:cNvPr>
+          <p:cNvPicPr>
+            <a:picLocks noChangeAspect="1" noChangeArrowheads="1"/>
+          </p:cNvPicPr>
+          <p:nvPr/>
+        </p:nvPicPr>
+        <p:blipFill rotWithShape="1">
+          <a:blip r:embed="rId2">
+            <a:extLst>
+              <a:ext uri="{28A0092B-C50C-407E-A947-70E740481C1C}">
+                <a14:useLocalDpi xmlns:a14="http://schemas.microsoft.com/office/drawing/2010/main" val="0"/>
+              </a:ext>
+            </a:extLst>
+          </a:blip>
+          <a:srcRect l="21191" r="21160"/>
+          <a:stretch/>
+        </p:blipFill>
+        <p:spPr bwMode="auto">
+          <a:xfrm>
+            <a:off x="1" y="10"/>
+            <a:ext cx="7028495" cy="6857990"/>
+          </a:xfrm>
+          <a:custGeom>
+            <a:avLst/>
+            <a:gdLst/>
+            <a:ahLst/>
+            <a:cxnLst/>
+            <a:rect l="l" t="t" r="r" b="b"/>
+            <a:pathLst>
+              <a:path w="7028495" h="6858000">
+                <a:moveTo>
+                  <a:pt x="0" y="0"/>
+                </a:moveTo>
+                <a:lnTo>
+                  <a:pt x="6915668" y="0"/>
+                </a:lnTo>
+                <a:lnTo>
+                  <a:pt x="6952411" y="219663"/>
+                </a:lnTo>
+                <a:cubicBezTo>
+                  <a:pt x="7002551" y="569921"/>
+                  <a:pt x="7028495" y="927986"/>
+                  <a:pt x="7028495" y="1292112"/>
+                </a:cubicBezTo>
+                <a:cubicBezTo>
+                  <a:pt x="7028495" y="3343346"/>
+                  <a:pt x="6205186" y="5202289"/>
+                  <a:pt x="4870994" y="6556512"/>
+                </a:cubicBezTo>
+                <a:lnTo>
+                  <a:pt x="4556185" y="6858000"/>
+                </a:lnTo>
+                <a:lnTo>
+                  <a:pt x="0" y="6858000"/>
+                </a:lnTo>
+                <a:close/>
+              </a:path>
+            </a:pathLst>
+          </a:custGeom>
+          <a:noFill/>
+          <a:extLst>
+            <a:ext uri="{909E8E84-426E-40DD-AFC4-6F175D3DCCD1}">
+              <a14:hiddenFill xmlns:a14="http://schemas.microsoft.com/office/drawing/2010/main">
+                <a:solidFill>
+                  <a:srgbClr val="FFFFFF"/>
+                </a:solidFill>
+              </a14:hiddenFill>
+            </a:ext>
+          </a:extLst>
+        </p:spPr>
+      </p:pic>
+    </p:spTree>
+    <p:extLst>
+      <p:ext uri="{BB962C8B-B14F-4D97-AF65-F5344CB8AC3E}">
+        <p14:creationId xmlns:p14="http://schemas.microsoft.com/office/powerpoint/2010/main" val="1832980330"/>
+      </p:ext>
+    </p:extLst>
+  </p:cSld>
+  <p:clrMapOvr>
+    <a:overrideClrMapping bg1="dk1" tx1="lt1" bg2="dk2" tx2="lt2" accent1="accent1" accent2="accent2" accent3="accent3" accent4="accent4" accent5="accent5" accent6="accent6" hlink="hlink" folHlink="folHlink"/>
+  </p:clrMapOvr>
+  <p:timing>
+    <p:tnLst>
+      <p:par>
+        <p:cTn id="1" dur="indefinite" restart="never" nodeType="tmRoot">
+          <p:childTnLst>
+            <p:seq concurrent="1" nextAc="seek">
+              <p:cTn id="2" dur="indefinite" nodeType="mainSeq">
+                <p:childTnLst>
+                  <p:par>
+                    <p:cTn id="3" fill="hold">
+                      <p:stCondLst>
+                        <p:cond delay="indefinite"/>
+                        <p:cond evt="onBegin" delay="0">
+                          <p:tn val="2"/>
+                        </p:cond>
+                      </p:stCondLst>
+                      <p:childTnLst>
+                        <p:par>
+                          <p:cTn id="4" fill="hold">
+                            <p:stCondLst>
+                              <p:cond delay="0"/>
+                            </p:stCondLst>
+                            <p:childTnLst>
+                              <p:par>
+                                <p:cTn id="5" presetID="10" presetClass="entr" presetSubtype="0" fill="hold" grpId="0" nodeType="withEffect">
+                                  <p:stCondLst>
+                                    <p:cond delay="1000"/>
+                                  </p:stCondLst>
+                                  <p:iterate type="lt">
+                                    <p:tmPct val="10000"/>
+                                  </p:iterate>
+                                  <p:childTnLst>
+                                    <p:set>
+                                      <p:cBhvr>
+                                        <p:cTn id="6" dur="1" fill="hold">
+                                          <p:stCondLst>
+                                            <p:cond delay="0"/>
+                                          </p:stCondLst>
+                                        </p:cTn>
+                                        <p:tgtEl>
+                                          <p:spTgt spid="2"/>
+                                        </p:tgtEl>
+                                        <p:attrNameLst>
+                                          <p:attrName>style.visibility</p:attrName>
+                                        </p:attrNameLst>
+                                      </p:cBhvr>
+                                      <p:to>
+                                        <p:strVal val="visible"/>
+                                      </p:to>
+                                    </p:set>
+                                    <p:animEffect transition="in" filter="fade">
+                                      <p:cBhvr>
+                                        <p:cTn id="7" dur="400"/>
+                                        <p:tgtEl>
+                                          <p:spTgt spid="2"/>
+                                        </p:tgtEl>
+                                      </p:cBhvr>
+                                    </p:animEffect>
+                                  </p:childTnLst>
+                                </p:cTn>
+                              </p:par>
+                            </p:childTnLst>
+                          </p:cTn>
+                        </p:par>
+                      </p:childTnLst>
+                    </p:cTn>
+                  </p:par>
+                </p:childTnLst>
+              </p:cTn>
+              <p:prevCondLst>
+                <p:cond evt="onPrev" delay="0">
+                  <p:tgtEl>
+                    <p:sldTgt/>
+                  </p:tgtEl>
+                </p:cond>
+              </p:prevCondLst>
+              <p:nextCondLst>
+                <p:cond evt="onNext" delay="0">
+                  <p:tgtEl>
+                    <p:sldTgt/>
+                  </p:tgtEl>
+                </p:cond>
+              </p:nextCondLst>
+            </p:seq>
+          </p:childTnLst>
+        </p:cTn>
+      </p:par>
+    </p:tnLst>
+    <p:bldLst>
+      <p:bldP spid="2" grpId="0"/>
+    </p:bldLst>
+  </p:timing>
+</p:sld>
+</file>
+
+<file path=ppt/slides/slide5.xml><?xml version="1.0" encoding="utf-8"?>
+<p:sld xmlns:a="http://schemas.openxmlformats.org/drawingml/2006/main" xmlns:r="http://schemas.openxmlformats.org/officeDocument/2006/relationships" xmlns:p="http://schemas.openxmlformats.org/presentationml/2006/main">
+  <p:cSld>
+    <p:bg>
+      <p:bgPr>
+        <a:solidFill>
           <a:schemeClr val="bg1"/>
         </a:solidFill>
         <a:effectLst/>
@@ -7011,14 +7412,6 @@
           <a:p>
             <a:pPr algn="ctr"/>
             <a:r>
-              <a:rPr lang="en-US" sz="4800" dirty="0">
-                <a:solidFill>
-                  <a:srgbClr val="FFFFFF"/>
-                </a:solidFill>
-              </a:rPr>
-              <a:t>2</a:t>
-            </a:r>
-            <a:r>
               <a:rPr lang="en-US" sz="4800" kern="1200" dirty="0">
                 <a:solidFill>
                   <a:srgbClr val="FFFFFF"/>
@@ -7027,7 +7420,7 @@
                 <a:ea typeface="+mj-ea"/>
                 <a:cs typeface="+mj-cs"/>
               </a:rPr>
-              <a:t>. </a:t>
+              <a:t>3. </a:t>
             </a:r>
             <a:r>
               <a:rPr lang="en-US" sz="4800" kern="1200" dirty="0" err="1">
@@ -7119,7 +7512,7 @@
 </p:sld>
 </file>
 
-<file path=ppt/slides/slide5.xml><?xml version="1.0" encoding="utf-8"?>
+<file path=ppt/slides/slide6.xml><?xml version="1.0" encoding="utf-8"?>
 <p:sld xmlns:a="http://schemas.openxmlformats.org/drawingml/2006/main" xmlns:r="http://schemas.openxmlformats.org/officeDocument/2006/relationships" xmlns:p="http://schemas.openxmlformats.org/presentationml/2006/main">
   <p:cSld>
     <p:bg>
@@ -7239,14 +7632,6 @@
           <a:p>
             <a:pPr algn="ctr"/>
             <a:r>
-              <a:rPr lang="en-US" sz="4800" dirty="0">
-                <a:solidFill>
-                  <a:srgbClr val="FFFFFF"/>
-                </a:solidFill>
-              </a:rPr>
-              <a:t>3</a:t>
-            </a:r>
-            <a:r>
               <a:rPr lang="en-US" sz="4800" kern="1200" dirty="0">
                 <a:solidFill>
                   <a:srgbClr val="FFFFFF"/>
@@ -7255,7 +7640,7 @@
                 <a:ea typeface="+mj-ea"/>
                 <a:cs typeface="+mj-cs"/>
               </a:rPr>
-              <a:t>. </a:t>
+              <a:t>4. </a:t>
             </a:r>
             <a:r>
               <a:rPr lang="en-US" sz="4800" kern="1200" dirty="0" err="1">
@@ -7347,7 +7732,7 @@
 </p:sld>
 </file>
 
-<file path=ppt/slides/slide6.xml><?xml version="1.0" encoding="utf-8"?>
+<file path=ppt/slides/slide7.xml><?xml version="1.0" encoding="utf-8"?>
 <p:sld xmlns:a="http://schemas.openxmlformats.org/drawingml/2006/main" xmlns:r="http://schemas.openxmlformats.org/officeDocument/2006/relationships" xmlns:p="http://schemas.openxmlformats.org/presentationml/2006/main">
   <p:cSld>
     <p:bg>
@@ -7571,9 +7956,14 @@
           <a:lstStyle/>
           <a:p>
             <a:r>
-              <a:rPr lang="en-US" sz="4800"/>
-              <a:t>5. Code du Projet</a:t>
+              <a:rPr lang="en-US" sz="4800" dirty="0"/>
+              <a:t>5. Code du </a:t>
             </a:r>
+            <a:r>
+              <a:rPr lang="en-US" sz="4800" dirty="0" err="1"/>
+              <a:t>Projet</a:t>
+            </a:r>
+            <a:endParaRPr lang="en-US" sz="4800" dirty="0"/>
           </a:p>
         </p:txBody>
       </p:sp>
@@ -7751,7 +8141,7 @@
 </p:sld>
 </file>
 
-<file path=ppt/slides/slide7.xml><?xml version="1.0" encoding="utf-8"?>
+<file path=ppt/slides/slide8.xml><?xml version="1.0" encoding="utf-8"?>
 <p:sld xmlns:a="http://schemas.openxmlformats.org/drawingml/2006/main" xmlns:r="http://schemas.openxmlformats.org/officeDocument/2006/relationships" xmlns:p="http://schemas.openxmlformats.org/presentationml/2006/main">
   <p:cSld>
     <p:bg>
@@ -7998,7 +8388,7 @@
 </p:sld>
 </file>
 
-<file path=ppt/slides/slide8.xml><?xml version="1.0" encoding="utf-8"?>
+<file path=ppt/slides/slide9.xml><?xml version="1.0" encoding="utf-8"?>
 <p:sld xmlns:a="http://schemas.openxmlformats.org/drawingml/2006/main" xmlns:r="http://schemas.openxmlformats.org/officeDocument/2006/relationships" xmlns:p="http://schemas.openxmlformats.org/presentationml/2006/main">
   <p:cSld>
     <p:bg>

</xml_diff>